<commit_message>
Adding documents & ppt
</commit_message>
<xml_diff>
--- a/Presentations/Sprint1Presentation.pptx
+++ b/Presentations/Sprint1Presentation.pptx
@@ -18,23 +18,21 @@
     <p:sldId id="263" r:id="rId13"/>
     <p:sldId id="264" r:id="rId14"/>
     <p:sldId id="265" r:id="rId15"/>
-    <p:sldId id="266" r:id="rId16"/>
-    <p:sldId id="267" r:id="rId17"/>
   </p:sldIdLst>
   <p:sldSz cy="5143500" cx="9144000"/>
   <p:notesSz cx="6858000" cy="9144000"/>
   <p:embeddedFontLst>
     <p:embeddedFont>
       <p:font typeface="Roboto Slab"/>
-      <p:regular r:id="rId18"/>
-      <p:bold r:id="rId19"/>
+      <p:regular r:id="rId16"/>
+      <p:bold r:id="rId17"/>
     </p:embeddedFont>
     <p:embeddedFont>
       <p:font typeface="Roboto"/>
-      <p:regular r:id="rId20"/>
-      <p:bold r:id="rId21"/>
-      <p:italic r:id="rId22"/>
-      <p:boldItalic r:id="rId23"/>
+      <p:regular r:id="rId18"/>
+      <p:bold r:id="rId19"/>
+      <p:italic r:id="rId20"/>
+      <p:boldItalic r:id="rId21"/>
     </p:embeddedFont>
   </p:embeddedFontLst>
   <p:defaultTextStyle>
@@ -815,7 +813,7 @@
   <p:cSld>
     <p:spTree>
       <p:nvGrpSpPr>
-        <p:cNvPr id="113" name="Shape 113"/>
+        <p:cNvPr id="114" name="Shape 114"/>
         <p:cNvGrpSpPr/>
         <p:nvPr/>
       </p:nvGrpSpPr>
@@ -829,7 +827,7 @@
       </p:grpSpPr>
       <p:sp>
         <p:nvSpPr>
-          <p:cNvPr id="114" name="Google Shape;114;g794e5b101c_1_1074:notes"/>
+          <p:cNvPr id="115" name="Google Shape;115;gb72c80da66_1_0:notes"/>
           <p:cNvSpPr/>
           <p:nvPr>
             <p:ph idx="2" type="sldImg"/>
@@ -864,205 +862,7 @@
       </p:sp>
       <p:sp>
         <p:nvSpPr>
-          <p:cNvPr id="115" name="Google Shape;115;g794e5b101c_1_1074:notes"/>
-          <p:cNvSpPr txBox="1"/>
-          <p:nvPr>
-            <p:ph idx="1" type="body"/>
-          </p:nvPr>
-        </p:nvSpPr>
-        <p:spPr>
-          <a:xfrm>
-            <a:off x="685800" y="4343400"/>
-            <a:ext cx="5486400" cy="4114800"/>
-          </a:xfrm>
-          <a:prstGeom prst="rect">
-            <a:avLst/>
-          </a:prstGeom>
-        </p:spPr>
-        <p:txBody>
-          <a:bodyPr anchorCtr="0" anchor="t" bIns="91425" lIns="91425" spcFirstLastPara="1" rIns="91425" wrap="square" tIns="91425">
-            <a:noAutofit/>
-          </a:bodyPr>
-          <a:lstStyle/>
-          <a:p>
-            <a:pPr indent="0" lvl="0" marL="0" rtl="0" algn="l">
-              <a:spcBef>
-                <a:spcPts val="0"/>
-              </a:spcBef>
-              <a:spcAft>
-                <a:spcPts val="0"/>
-              </a:spcAft>
-              <a:buNone/>
-            </a:pPr>
-            <a:r>
-              <a:t/>
-            </a:r>
-            <a:endParaRPr/>
-          </a:p>
-        </p:txBody>
-      </p:sp>
-    </p:spTree>
-  </p:cSld>
-  <p:clrMapOvr>
-    <a:masterClrMapping/>
-  </p:clrMapOvr>
-</p:notes>
-</file>
-
-<file path=ppt/notesSlides/notesSlide11.xml><?xml version="1.0" encoding="utf-8"?>
-<p:notes xmlns:a="http://schemas.openxmlformats.org/drawingml/2006/main" xmlns:r="http://schemas.openxmlformats.org/officeDocument/2006/relationships" xmlns:mc="http://schemas.openxmlformats.org/markup-compatibility/2006" xmlns:mv="urn:schemas-microsoft-com:mac:vml" xmlns:p="http://schemas.openxmlformats.org/presentationml/2006/main" xmlns:c="http://schemas.openxmlformats.org/drawingml/2006/chart" xmlns:dgm="http://schemas.openxmlformats.org/drawingml/2006/diagram" xmlns:o="urn:schemas-microsoft-com:office:office" xmlns:v="urn:schemas-microsoft-com:vml" xmlns:pvml="urn:schemas-microsoft-com:office:powerpoint" xmlns:com="http://schemas.openxmlformats.org/drawingml/2006/compatibility" xmlns:p14="http://schemas.microsoft.com/office/powerpoint/2010/main" xmlns:p15="http://schemas.microsoft.com/office/powerpoint/2012/main" xmlns:ahyp="http://schemas.microsoft.com/office/drawing/2018/hyperlinkcolor" showMasterPhAnim="0" showMasterSp="0">
-  <p:cSld>
-    <p:spTree>
-      <p:nvGrpSpPr>
-        <p:cNvPr id="119" name="Shape 119"/>
-        <p:cNvGrpSpPr/>
-        <p:nvPr/>
-      </p:nvGrpSpPr>
-      <p:grpSpPr>
-        <a:xfrm>
-          <a:off x="0" y="0"/>
-          <a:ext cx="0" cy="0"/>
-          <a:chOff x="0" y="0"/>
-          <a:chExt cx="0" cy="0"/>
-        </a:xfrm>
-      </p:grpSpPr>
-      <p:sp>
-        <p:nvSpPr>
-          <p:cNvPr id="120" name="Google Shape;120;gb75b1524d4_0_0:notes"/>
-          <p:cNvSpPr/>
-          <p:nvPr>
-            <p:ph idx="2" type="sldImg"/>
-          </p:nvPr>
-        </p:nvSpPr>
-        <p:spPr>
-          <a:xfrm>
-            <a:off x="381300" y="685800"/>
-            <a:ext cx="6096000" cy="3429000"/>
-          </a:xfrm>
-          <a:custGeom>
-            <a:rect b="b" l="l" r="r" t="t"/>
-            <a:pathLst>
-              <a:path extrusionOk="0" h="120000" w="120000">
-                <a:moveTo>
-                  <a:pt x="0" y="0"/>
-                </a:moveTo>
-                <a:lnTo>
-                  <a:pt x="120000" y="0"/>
-                </a:lnTo>
-                <a:lnTo>
-                  <a:pt x="120000" y="120000"/>
-                </a:lnTo>
-                <a:lnTo>
-                  <a:pt x="0" y="120000"/>
-                </a:lnTo>
-                <a:close/>
-              </a:path>
-            </a:pathLst>
-          </a:custGeom>
-        </p:spPr>
-      </p:sp>
-      <p:sp>
-        <p:nvSpPr>
-          <p:cNvPr id="121" name="Google Shape;121;gb75b1524d4_0_0:notes"/>
-          <p:cNvSpPr txBox="1"/>
-          <p:nvPr>
-            <p:ph idx="1" type="body"/>
-          </p:nvPr>
-        </p:nvSpPr>
-        <p:spPr>
-          <a:xfrm>
-            <a:off x="685800" y="4343400"/>
-            <a:ext cx="5486400" cy="4114800"/>
-          </a:xfrm>
-          <a:prstGeom prst="rect">
-            <a:avLst/>
-          </a:prstGeom>
-        </p:spPr>
-        <p:txBody>
-          <a:bodyPr anchorCtr="0" anchor="t" bIns="91425" lIns="91425" spcFirstLastPara="1" rIns="91425" wrap="square" tIns="91425">
-            <a:noAutofit/>
-          </a:bodyPr>
-          <a:lstStyle/>
-          <a:p>
-            <a:pPr indent="0" lvl="0" marL="0" rtl="0" algn="l">
-              <a:spcBef>
-                <a:spcPts val="0"/>
-              </a:spcBef>
-              <a:spcAft>
-                <a:spcPts val="0"/>
-              </a:spcAft>
-              <a:buNone/>
-            </a:pPr>
-            <a:r>
-              <a:t/>
-            </a:r>
-            <a:endParaRPr/>
-          </a:p>
-        </p:txBody>
-      </p:sp>
-    </p:spTree>
-  </p:cSld>
-  <p:clrMapOvr>
-    <a:masterClrMapping/>
-  </p:clrMapOvr>
-</p:notes>
-</file>
-
-<file path=ppt/notesSlides/notesSlide12.xml><?xml version="1.0" encoding="utf-8"?>
-<p:notes xmlns:a="http://schemas.openxmlformats.org/drawingml/2006/main" xmlns:r="http://schemas.openxmlformats.org/officeDocument/2006/relationships" xmlns:mc="http://schemas.openxmlformats.org/markup-compatibility/2006" xmlns:mv="urn:schemas-microsoft-com:mac:vml" xmlns:p="http://schemas.openxmlformats.org/presentationml/2006/main" xmlns:c="http://schemas.openxmlformats.org/drawingml/2006/chart" xmlns:dgm="http://schemas.openxmlformats.org/drawingml/2006/diagram" xmlns:o="urn:schemas-microsoft-com:office:office" xmlns:v="urn:schemas-microsoft-com:vml" xmlns:pvml="urn:schemas-microsoft-com:office:powerpoint" xmlns:com="http://schemas.openxmlformats.org/drawingml/2006/compatibility" xmlns:p14="http://schemas.microsoft.com/office/powerpoint/2010/main" xmlns:p15="http://schemas.microsoft.com/office/powerpoint/2012/main" xmlns:ahyp="http://schemas.microsoft.com/office/drawing/2018/hyperlinkcolor" showMasterPhAnim="0" showMasterSp="0">
-  <p:cSld>
-    <p:spTree>
-      <p:nvGrpSpPr>
-        <p:cNvPr id="126" name="Shape 126"/>
-        <p:cNvGrpSpPr/>
-        <p:nvPr/>
-      </p:nvGrpSpPr>
-      <p:grpSpPr>
-        <a:xfrm>
-          <a:off x="0" y="0"/>
-          <a:ext cx="0" cy="0"/>
-          <a:chOff x="0" y="0"/>
-          <a:chExt cx="0" cy="0"/>
-        </a:xfrm>
-      </p:grpSpPr>
-      <p:sp>
-        <p:nvSpPr>
-          <p:cNvPr id="127" name="Google Shape;127;g794e5b101c_1_1010:notes"/>
-          <p:cNvSpPr/>
-          <p:nvPr>
-            <p:ph idx="2" type="sldImg"/>
-          </p:nvPr>
-        </p:nvSpPr>
-        <p:spPr>
-          <a:xfrm>
-            <a:off x="381300" y="685800"/>
-            <a:ext cx="6096000" cy="3429000"/>
-          </a:xfrm>
-          <a:custGeom>
-            <a:rect b="b" l="l" r="r" t="t"/>
-            <a:pathLst>
-              <a:path extrusionOk="0" h="120000" w="120000">
-                <a:moveTo>
-                  <a:pt x="0" y="0"/>
-                </a:moveTo>
-                <a:lnTo>
-                  <a:pt x="120000" y="0"/>
-                </a:lnTo>
-                <a:lnTo>
-                  <a:pt x="120000" y="120000"/>
-                </a:lnTo>
-                <a:lnTo>
-                  <a:pt x="0" y="120000"/>
-                </a:lnTo>
-                <a:close/>
-              </a:path>
-            </a:pathLst>
-          </a:custGeom>
-        </p:spPr>
-      </p:sp>
-      <p:sp>
-        <p:nvSpPr>
-          <p:cNvPr id="128" name="Google Shape;128;g794e5b101c_1_1010:notes"/>
+          <p:cNvPr id="116" name="Google Shape;116;gb72c80da66_1_0:notes"/>
           <p:cNvSpPr txBox="1"/>
           <p:nvPr>
             <p:ph idx="1" type="body"/>
@@ -1225,7 +1025,7 @@
       </p:grpSpPr>
       <p:sp>
         <p:nvSpPr>
-          <p:cNvPr id="72" name="Google Shape;72;gb72c80da66_1_6:notes"/>
+          <p:cNvPr id="72" name="Google Shape;72;g794e5b101c_1_1005:notes"/>
           <p:cNvSpPr/>
           <p:nvPr>
             <p:ph idx="2" type="sldImg"/>
@@ -1260,7 +1060,7 @@
       </p:sp>
       <p:sp>
         <p:nvSpPr>
-          <p:cNvPr id="73" name="Google Shape;73;gb72c80da66_1_6:notes"/>
+          <p:cNvPr id="73" name="Google Shape;73;g794e5b101c_1_1005:notes"/>
           <p:cNvSpPr txBox="1"/>
           <p:nvPr>
             <p:ph idx="1" type="body"/>
@@ -1324,7 +1124,7 @@
       </p:grpSpPr>
       <p:sp>
         <p:nvSpPr>
-          <p:cNvPr id="78" name="Google Shape;78;g794e5b101c_1_1005:notes"/>
+          <p:cNvPr id="78" name="Google Shape;78;g794e5b101c_1_1069:notes"/>
           <p:cNvSpPr/>
           <p:nvPr>
             <p:ph idx="2" type="sldImg"/>
@@ -1359,7 +1159,7 @@
       </p:sp>
       <p:sp>
         <p:nvSpPr>
-          <p:cNvPr id="79" name="Google Shape;79;g794e5b101c_1_1005:notes"/>
+          <p:cNvPr id="79" name="Google Shape;79;g794e5b101c_1_1069:notes"/>
           <p:cNvSpPr txBox="1"/>
           <p:nvPr>
             <p:ph idx="1" type="body"/>
@@ -1423,7 +1223,7 @@
       </p:grpSpPr>
       <p:sp>
         <p:nvSpPr>
-          <p:cNvPr id="84" name="Google Shape;84;gb72c80da66_1_11:notes"/>
+          <p:cNvPr id="84" name="Google Shape;84;g794e5b101c_1_1079:notes"/>
           <p:cNvSpPr/>
           <p:nvPr>
             <p:ph idx="2" type="sldImg"/>
@@ -1458,7 +1258,7 @@
       </p:sp>
       <p:sp>
         <p:nvSpPr>
-          <p:cNvPr id="85" name="Google Shape;85;gb72c80da66_1_11:notes"/>
+          <p:cNvPr id="85" name="Google Shape;85;g794e5b101c_1_1079:notes"/>
           <p:cNvSpPr txBox="1"/>
           <p:nvPr>
             <p:ph idx="1" type="body"/>
@@ -1522,7 +1322,7 @@
       </p:grpSpPr>
       <p:sp>
         <p:nvSpPr>
-          <p:cNvPr id="90" name="Google Shape;90;g794e5b101c_1_1079:notes"/>
+          <p:cNvPr id="90" name="Google Shape;90;gb72c80da66_0_0:notes"/>
           <p:cNvSpPr/>
           <p:nvPr>
             <p:ph idx="2" type="sldImg"/>
@@ -1557,7 +1357,7 @@
       </p:sp>
       <p:sp>
         <p:nvSpPr>
-          <p:cNvPr id="91" name="Google Shape;91;g794e5b101c_1_1079:notes"/>
+          <p:cNvPr id="91" name="Google Shape;91;gb72c80da66_0_0:notes"/>
           <p:cNvSpPr txBox="1"/>
           <p:nvPr>
             <p:ph idx="1" type="body"/>
@@ -1621,7 +1421,7 @@
       </p:grpSpPr>
       <p:sp>
         <p:nvSpPr>
-          <p:cNvPr id="96" name="Google Shape;96;gb72c80da66_0_0:notes"/>
+          <p:cNvPr id="96" name="Google Shape;96;gb72c80da66_1_6:notes"/>
           <p:cNvSpPr/>
           <p:nvPr>
             <p:ph idx="2" type="sldImg"/>
@@ -1656,7 +1456,7 @@
       </p:sp>
       <p:sp>
         <p:nvSpPr>
-          <p:cNvPr id="97" name="Google Shape;97;gb72c80da66_0_0:notes"/>
+          <p:cNvPr id="97" name="Google Shape;97;gb72c80da66_1_6:notes"/>
           <p:cNvSpPr txBox="1"/>
           <p:nvPr>
             <p:ph idx="1" type="body"/>
@@ -1720,7 +1520,7 @@
       </p:grpSpPr>
       <p:sp>
         <p:nvSpPr>
-          <p:cNvPr id="102" name="Google Shape;102;g794e5b101c_1_1069:notes"/>
+          <p:cNvPr id="102" name="Google Shape;102;gb75b1524d4_0_0:notes"/>
           <p:cNvSpPr/>
           <p:nvPr>
             <p:ph idx="2" type="sldImg"/>
@@ -1755,7 +1555,7 @@
       </p:sp>
       <p:sp>
         <p:nvSpPr>
-          <p:cNvPr id="103" name="Google Shape;103;g794e5b101c_1_1069:notes"/>
+          <p:cNvPr id="103" name="Google Shape;103;gb75b1524d4_0_0:notes"/>
           <p:cNvSpPr txBox="1"/>
           <p:nvPr>
             <p:ph idx="1" type="body"/>
@@ -1805,7 +1605,7 @@
   <p:cSld>
     <p:spTree>
       <p:nvGrpSpPr>
-        <p:cNvPr id="107" name="Shape 107"/>
+        <p:cNvPr id="108" name="Shape 108"/>
         <p:cNvGrpSpPr/>
         <p:nvPr/>
       </p:nvGrpSpPr>
@@ -1819,7 +1619,7 @@
       </p:grpSpPr>
       <p:sp>
         <p:nvSpPr>
-          <p:cNvPr id="108" name="Google Shape;108;gb72c80da66_1_0:notes"/>
+          <p:cNvPr id="109" name="Google Shape;109;g794e5b101c_1_1010:notes"/>
           <p:cNvSpPr/>
           <p:nvPr>
             <p:ph idx="2" type="sldImg"/>
@@ -1854,7 +1654,7 @@
       </p:sp>
       <p:sp>
         <p:nvSpPr>
-          <p:cNvPr id="109" name="Google Shape;109;gb72c80da66_1_0:notes"/>
+          <p:cNvPr id="110" name="Google Shape;110;g794e5b101c_1_1010:notes"/>
           <p:cNvSpPr txBox="1"/>
           <p:nvPr>
             <p:ph idx="1" type="body"/>
@@ -7317,7 +7117,7 @@
   <p:cSld>
     <p:spTree>
       <p:nvGrpSpPr>
-        <p:cNvPr id="116" name="Shape 116"/>
+        <p:cNvPr id="117" name="Shape 117"/>
         <p:cNvGrpSpPr/>
         <p:nvPr/>
       </p:nvGrpSpPr>
@@ -7331,7 +7131,7 @@
       </p:grpSpPr>
       <p:sp>
         <p:nvSpPr>
-          <p:cNvPr id="117" name="Google Shape;117;p22"/>
+          <p:cNvPr id="118" name="Google Shape;118;p22"/>
           <p:cNvSpPr txBox="1"/>
           <p:nvPr>
             <p:ph type="title"/>
@@ -7363,7 +7163,7 @@
             </a:pPr>
             <a:r>
               <a:rPr lang="en"/>
-              <a:t>Database Schema</a:t>
+              <a:t>Conceptual UI Design (App)</a:t>
             </a:r>
             <a:endParaRPr/>
           </a:p>
@@ -7371,7 +7171,7 @@
       </p:sp>
       <p:pic>
         <p:nvPicPr>
-          <p:cNvPr id="118" name="Google Shape;118;p22"/>
+          <p:cNvPr id="119" name="Google Shape;119;p22"/>
           <p:cNvPicPr preferRelativeResize="0"/>
           <p:nvPr/>
         </p:nvPicPr>
@@ -7385,8 +7185,8 @@
         </p:blipFill>
         <p:spPr>
           <a:xfrm>
-            <a:off x="1178249" y="1430225"/>
-            <a:ext cx="6787500" cy="3262950"/>
+            <a:off x="864138" y="1762522"/>
+            <a:ext cx="7415726" cy="2533503"/>
           </a:xfrm>
           <a:prstGeom prst="rect">
             <a:avLst/>
@@ -7397,458 +7197,6 @@
           </a:ln>
         </p:spPr>
       </p:pic>
-    </p:spTree>
-  </p:cSld>
-  <p:clrMapOvr>
-    <a:masterClrMapping/>
-  </p:clrMapOvr>
-</p:sld>
-</file>
-
-<file path=ppt/slides/slide11.xml><?xml version="1.0" encoding="utf-8"?>
-<p:sld xmlns:a="http://schemas.openxmlformats.org/drawingml/2006/main" xmlns:r="http://schemas.openxmlformats.org/officeDocument/2006/relationships" xmlns:mc="http://schemas.openxmlformats.org/markup-compatibility/2006" xmlns:mv="urn:schemas-microsoft-com:mac:vml" xmlns:p="http://schemas.openxmlformats.org/presentationml/2006/main" xmlns:c="http://schemas.openxmlformats.org/drawingml/2006/chart" xmlns:dgm="http://schemas.openxmlformats.org/drawingml/2006/diagram" xmlns:o="urn:schemas-microsoft-com:office:office" xmlns:v="urn:schemas-microsoft-com:vml" xmlns:pvml="urn:schemas-microsoft-com:office:powerpoint" xmlns:com="http://schemas.openxmlformats.org/drawingml/2006/compatibility" xmlns:p14="http://schemas.microsoft.com/office/powerpoint/2010/main" xmlns:p15="http://schemas.microsoft.com/office/powerpoint/2012/main" xmlns:ahyp="http://schemas.microsoft.com/office/drawing/2018/hyperlinkcolor">
-  <p:cSld>
-    <p:spTree>
-      <p:nvGrpSpPr>
-        <p:cNvPr id="122" name="Shape 122"/>
-        <p:cNvGrpSpPr/>
-        <p:nvPr/>
-      </p:nvGrpSpPr>
-      <p:grpSpPr>
-        <a:xfrm>
-          <a:off x="0" y="0"/>
-          <a:ext cx="0" cy="0"/>
-          <a:chOff x="0" y="0"/>
-          <a:chExt cx="0" cy="0"/>
-        </a:xfrm>
-      </p:grpSpPr>
-      <p:sp>
-        <p:nvSpPr>
-          <p:cNvPr id="123" name="Google Shape;123;p23"/>
-          <p:cNvSpPr txBox="1"/>
-          <p:nvPr>
-            <p:ph type="title"/>
-          </p:nvPr>
-        </p:nvSpPr>
-        <p:spPr>
-          <a:xfrm>
-            <a:off x="387900" y="458025"/>
-            <a:ext cx="8368200" cy="686100"/>
-          </a:xfrm>
-          <a:prstGeom prst="rect">
-            <a:avLst/>
-          </a:prstGeom>
-        </p:spPr>
-        <p:txBody>
-          <a:bodyPr anchorCtr="0" anchor="b" bIns="91425" lIns="91425" spcFirstLastPara="1" rIns="91425" wrap="square" tIns="91425">
-            <a:noAutofit/>
-          </a:bodyPr>
-          <a:lstStyle/>
-          <a:p>
-            <a:pPr indent="0" lvl="0" marL="0" rtl="0" algn="l">
-              <a:spcBef>
-                <a:spcPts val="0"/>
-              </a:spcBef>
-              <a:spcAft>
-                <a:spcPts val="0"/>
-              </a:spcAft>
-              <a:buNone/>
-            </a:pPr>
-            <a:r>
-              <a:rPr lang="en"/>
-              <a:t>Sprint Schedule</a:t>
-            </a:r>
-            <a:endParaRPr/>
-          </a:p>
-        </p:txBody>
-      </p:sp>
-      <p:sp>
-        <p:nvSpPr>
-          <p:cNvPr id="124" name="Google Shape;124;p23"/>
-          <p:cNvSpPr txBox="1"/>
-          <p:nvPr>
-            <p:ph idx="1" type="body"/>
-          </p:nvPr>
-        </p:nvSpPr>
-        <p:spPr>
-          <a:xfrm>
-            <a:off x="387900" y="1489825"/>
-            <a:ext cx="3999900" cy="3078900"/>
-          </a:xfrm>
-          <a:prstGeom prst="rect">
-            <a:avLst/>
-          </a:prstGeom>
-        </p:spPr>
-        <p:txBody>
-          <a:bodyPr anchorCtr="0" anchor="t" bIns="91425" lIns="91425" spcFirstLastPara="1" rIns="91425" wrap="square" tIns="91425">
-            <a:noAutofit/>
-          </a:bodyPr>
-          <a:lstStyle/>
-          <a:p>
-            <a:pPr indent="-317500" lvl="0" marL="457200" rtl="0" algn="l">
-              <a:lnSpc>
-                <a:spcPct val="200000"/>
-              </a:lnSpc>
-              <a:spcBef>
-                <a:spcPts val="0"/>
-              </a:spcBef>
-              <a:spcAft>
-                <a:spcPts val="0"/>
-              </a:spcAft>
-              <a:buSzPts val="1400"/>
-              <a:buAutoNum type="arabicPeriod"/>
-            </a:pPr>
-            <a:r>
-              <a:rPr lang="en"/>
-              <a:t>Project Details and Requirements</a:t>
-            </a:r>
-            <a:endParaRPr/>
-          </a:p>
-          <a:p>
-            <a:pPr indent="-317500" lvl="0" marL="457200" rtl="0" algn="l">
-              <a:lnSpc>
-                <a:spcPct val="200000"/>
-              </a:lnSpc>
-              <a:spcBef>
-                <a:spcPts val="0"/>
-              </a:spcBef>
-              <a:spcAft>
-                <a:spcPts val="0"/>
-              </a:spcAft>
-              <a:buSzPts val="1400"/>
-              <a:buAutoNum type="arabicPeriod"/>
-            </a:pPr>
-            <a:r>
-              <a:rPr lang="en"/>
-              <a:t>User Account Creation (Jan 21st - 25th)</a:t>
-            </a:r>
-            <a:endParaRPr/>
-          </a:p>
-          <a:p>
-            <a:pPr indent="-317500" lvl="0" marL="457200" rtl="0" algn="l">
-              <a:lnSpc>
-                <a:spcPct val="200000"/>
-              </a:lnSpc>
-              <a:spcBef>
-                <a:spcPts val="0"/>
-              </a:spcBef>
-              <a:spcAft>
-                <a:spcPts val="0"/>
-              </a:spcAft>
-              <a:buSzPts val="1400"/>
-              <a:buAutoNum type="arabicPeriod"/>
-            </a:pPr>
-            <a:r>
-              <a:rPr lang="en"/>
-              <a:t>Facial Recognition (Jan 26th - Feb 8th)</a:t>
-            </a:r>
-            <a:endParaRPr/>
-          </a:p>
-          <a:p>
-            <a:pPr indent="-317500" lvl="0" marL="457200" rtl="0" algn="l">
-              <a:lnSpc>
-                <a:spcPct val="200000"/>
-              </a:lnSpc>
-              <a:spcBef>
-                <a:spcPts val="0"/>
-              </a:spcBef>
-              <a:spcAft>
-                <a:spcPts val="0"/>
-              </a:spcAft>
-              <a:buSzPts val="1400"/>
-              <a:buAutoNum type="arabicPeriod"/>
-            </a:pPr>
-            <a:r>
-              <a:rPr lang="en"/>
-              <a:t>Iris Recognition (Feb 9th - 15th)</a:t>
-            </a:r>
-            <a:endParaRPr/>
-          </a:p>
-          <a:p>
-            <a:pPr indent="-317500" lvl="0" marL="457200" rtl="0" algn="l">
-              <a:lnSpc>
-                <a:spcPct val="200000"/>
-              </a:lnSpc>
-              <a:spcBef>
-                <a:spcPts val="0"/>
-              </a:spcBef>
-              <a:spcAft>
-                <a:spcPts val="0"/>
-              </a:spcAft>
-              <a:buSzPts val="1400"/>
-              <a:buAutoNum type="arabicPeriod"/>
-            </a:pPr>
-            <a:r>
-              <a:rPr lang="en"/>
-              <a:t>Fingerprints (Feb 16th - March 1st)</a:t>
-            </a:r>
-            <a:endParaRPr/>
-          </a:p>
-          <a:p>
-            <a:pPr indent="-317500" lvl="0" marL="457200" rtl="0" algn="l">
-              <a:spcBef>
-                <a:spcPts val="0"/>
-              </a:spcBef>
-              <a:spcAft>
-                <a:spcPts val="0"/>
-              </a:spcAft>
-              <a:buSzPts val="1400"/>
-              <a:buAutoNum type="arabicPeriod"/>
-            </a:pPr>
-            <a:r>
-              <a:rPr lang="en"/>
-              <a:t>Voice Detection (March 2nd - 15th)</a:t>
-            </a:r>
-            <a:endParaRPr/>
-          </a:p>
-        </p:txBody>
-      </p:sp>
-      <p:sp>
-        <p:nvSpPr>
-          <p:cNvPr id="125" name="Google Shape;125;p23"/>
-          <p:cNvSpPr txBox="1"/>
-          <p:nvPr>
-            <p:ph idx="2" type="body"/>
-          </p:nvPr>
-        </p:nvSpPr>
-        <p:spPr>
-          <a:xfrm>
-            <a:off x="4756200" y="1489825"/>
-            <a:ext cx="3999900" cy="3078900"/>
-          </a:xfrm>
-          <a:prstGeom prst="rect">
-            <a:avLst/>
-          </a:prstGeom>
-        </p:spPr>
-        <p:txBody>
-          <a:bodyPr anchorCtr="0" anchor="t" bIns="91425" lIns="91425" spcFirstLastPara="1" rIns="91425" wrap="square" tIns="91425">
-            <a:noAutofit/>
-          </a:bodyPr>
-          <a:lstStyle/>
-          <a:p>
-            <a:pPr indent="-317500" lvl="0" marL="457200" rtl="0" algn="l">
-              <a:lnSpc>
-                <a:spcPct val="200000"/>
-              </a:lnSpc>
-              <a:spcBef>
-                <a:spcPts val="0"/>
-              </a:spcBef>
-              <a:spcAft>
-                <a:spcPts val="0"/>
-              </a:spcAft>
-              <a:buSzPts val="1400"/>
-              <a:buAutoNum type="arabicPeriod" startAt="7"/>
-            </a:pPr>
-            <a:r>
-              <a:rPr lang="en"/>
-              <a:t>Oauth Integration (March 16th - 29th)</a:t>
-            </a:r>
-            <a:endParaRPr/>
-          </a:p>
-          <a:p>
-            <a:pPr indent="-317500" lvl="0" marL="457200" rtl="0" algn="l">
-              <a:lnSpc>
-                <a:spcPct val="200000"/>
-              </a:lnSpc>
-              <a:spcBef>
-                <a:spcPts val="0"/>
-              </a:spcBef>
-              <a:spcAft>
-                <a:spcPts val="0"/>
-              </a:spcAft>
-              <a:buSzPts val="1400"/>
-              <a:buAutoNum type="arabicPeriod" startAt="7"/>
-            </a:pPr>
-            <a:r>
-              <a:rPr lang="en"/>
-              <a:t>Stretch Goals (March 30th - April 5th)</a:t>
-            </a:r>
-            <a:endParaRPr/>
-          </a:p>
-          <a:p>
-            <a:pPr indent="-317500" lvl="0" marL="457200" rtl="0" algn="l">
-              <a:spcBef>
-                <a:spcPts val="0"/>
-              </a:spcBef>
-              <a:spcAft>
-                <a:spcPts val="0"/>
-              </a:spcAft>
-              <a:buSzPts val="1400"/>
-              <a:buAutoNum type="arabicPeriod" startAt="7"/>
-            </a:pPr>
-            <a:r>
-              <a:rPr lang="en"/>
-              <a:t>Finishing Touches &amp; Presentation (April 6th - 21st)	</a:t>
-            </a:r>
-            <a:endParaRPr/>
-          </a:p>
-        </p:txBody>
-      </p:sp>
-    </p:spTree>
-  </p:cSld>
-  <p:clrMapOvr>
-    <a:masterClrMapping/>
-  </p:clrMapOvr>
-</p:sld>
-</file>
-
-<file path=ppt/slides/slide12.xml><?xml version="1.0" encoding="utf-8"?>
-<p:sld xmlns:a="http://schemas.openxmlformats.org/drawingml/2006/main" xmlns:r="http://schemas.openxmlformats.org/officeDocument/2006/relationships" xmlns:mc="http://schemas.openxmlformats.org/markup-compatibility/2006" xmlns:mv="urn:schemas-microsoft-com:mac:vml" xmlns:p="http://schemas.openxmlformats.org/presentationml/2006/main" xmlns:c="http://schemas.openxmlformats.org/drawingml/2006/chart" xmlns:dgm="http://schemas.openxmlformats.org/drawingml/2006/diagram" xmlns:o="urn:schemas-microsoft-com:office:office" xmlns:v="urn:schemas-microsoft-com:vml" xmlns:pvml="urn:schemas-microsoft-com:office:powerpoint" xmlns:com="http://schemas.openxmlformats.org/drawingml/2006/compatibility" xmlns:p14="http://schemas.microsoft.com/office/powerpoint/2010/main" xmlns:p15="http://schemas.microsoft.com/office/powerpoint/2012/main" xmlns:ahyp="http://schemas.microsoft.com/office/drawing/2018/hyperlinkcolor">
-  <p:cSld>
-    <p:spTree>
-      <p:nvGrpSpPr>
-        <p:cNvPr id="129" name="Shape 129"/>
-        <p:cNvGrpSpPr/>
-        <p:nvPr/>
-      </p:nvGrpSpPr>
-      <p:grpSpPr>
-        <a:xfrm>
-          <a:off x="0" y="0"/>
-          <a:ext cx="0" cy="0"/>
-          <a:chOff x="0" y="0"/>
-          <a:chExt cx="0" cy="0"/>
-        </a:xfrm>
-      </p:grpSpPr>
-      <p:sp>
-        <p:nvSpPr>
-          <p:cNvPr id="130" name="Google Shape;130;p24"/>
-          <p:cNvSpPr txBox="1"/>
-          <p:nvPr>
-            <p:ph type="title"/>
-          </p:nvPr>
-        </p:nvSpPr>
-        <p:spPr>
-          <a:xfrm>
-            <a:off x="387900" y="458025"/>
-            <a:ext cx="8368200" cy="686100"/>
-          </a:xfrm>
-          <a:prstGeom prst="rect">
-            <a:avLst/>
-          </a:prstGeom>
-        </p:spPr>
-        <p:txBody>
-          <a:bodyPr anchorCtr="0" anchor="b" bIns="91425" lIns="91425" spcFirstLastPara="1" rIns="91425" wrap="square" tIns="91425">
-            <a:noAutofit/>
-          </a:bodyPr>
-          <a:lstStyle/>
-          <a:p>
-            <a:pPr indent="0" lvl="0" marL="0" rtl="0" algn="l">
-              <a:spcBef>
-                <a:spcPts val="0"/>
-              </a:spcBef>
-              <a:spcAft>
-                <a:spcPts val="0"/>
-              </a:spcAft>
-              <a:buNone/>
-            </a:pPr>
-            <a:r>
-              <a:rPr lang="en"/>
-              <a:t>Sprint 2 Preview: Creating a Login System</a:t>
-            </a:r>
-            <a:endParaRPr/>
-          </a:p>
-        </p:txBody>
-      </p:sp>
-      <p:sp>
-        <p:nvSpPr>
-          <p:cNvPr id="131" name="Google Shape;131;p24"/>
-          <p:cNvSpPr txBox="1"/>
-          <p:nvPr>
-            <p:ph idx="1" type="body"/>
-          </p:nvPr>
-        </p:nvSpPr>
-        <p:spPr>
-          <a:xfrm>
-            <a:off x="387900" y="1489824"/>
-            <a:ext cx="8368200" cy="3078900"/>
-          </a:xfrm>
-          <a:prstGeom prst="rect">
-            <a:avLst/>
-          </a:prstGeom>
-        </p:spPr>
-        <p:txBody>
-          <a:bodyPr anchorCtr="0" anchor="t" bIns="91425" lIns="91425" spcFirstLastPara="1" rIns="91425" wrap="square" tIns="91425">
-            <a:noAutofit/>
-          </a:bodyPr>
-          <a:lstStyle/>
-          <a:p>
-            <a:pPr indent="0" lvl="0" marL="0" rtl="0" algn="l">
-              <a:spcBef>
-                <a:spcPts val="0"/>
-              </a:spcBef>
-              <a:spcAft>
-                <a:spcPts val="0"/>
-              </a:spcAft>
-              <a:buNone/>
-            </a:pPr>
-            <a:r>
-              <a:rPr lang="en"/>
-              <a:t>Our approach for this sprint is to form groups of 2 and work together on the necessary tasks. We split the responsibilities as follows:</a:t>
-            </a:r>
-            <a:endParaRPr/>
-          </a:p>
-          <a:p>
-            <a:pPr indent="-342900" lvl="0" marL="457200" rtl="0" algn="l">
-              <a:lnSpc>
-                <a:spcPct val="150000"/>
-              </a:lnSpc>
-              <a:spcBef>
-                <a:spcPts val="1600"/>
-              </a:spcBef>
-              <a:spcAft>
-                <a:spcPts val="0"/>
-              </a:spcAft>
-              <a:buSzPts val="1800"/>
-              <a:buChar char="●"/>
-            </a:pPr>
-            <a:r>
-              <a:rPr lang="en"/>
-              <a:t>Database Setup- Steven and Samuel</a:t>
-            </a:r>
-            <a:endParaRPr/>
-          </a:p>
-          <a:p>
-            <a:pPr indent="-342900" lvl="0" marL="457200" rtl="0" algn="l">
-              <a:lnSpc>
-                <a:spcPct val="150000"/>
-              </a:lnSpc>
-              <a:spcBef>
-                <a:spcPts val="0"/>
-              </a:spcBef>
-              <a:spcAft>
-                <a:spcPts val="0"/>
-              </a:spcAft>
-              <a:buSzPts val="1800"/>
-              <a:buChar char="●"/>
-            </a:pPr>
-            <a:r>
-              <a:rPr lang="en"/>
-              <a:t>Front-End design- Alex and Andy</a:t>
-            </a:r>
-            <a:endParaRPr/>
-          </a:p>
-          <a:p>
-            <a:pPr indent="-342900" lvl="0" marL="457200" rtl="0" algn="l">
-              <a:lnSpc>
-                <a:spcPct val="150000"/>
-              </a:lnSpc>
-              <a:spcBef>
-                <a:spcPts val="0"/>
-              </a:spcBef>
-              <a:spcAft>
-                <a:spcPts val="0"/>
-              </a:spcAft>
-              <a:buSzPts val="1800"/>
-              <a:buChar char="●"/>
-            </a:pPr>
-            <a:r>
-              <a:rPr lang="en"/>
-              <a:t>Backend design- Jacob and Nick</a:t>
-            </a:r>
-            <a:endParaRPr/>
-          </a:p>
-        </p:txBody>
-      </p:sp>
     </p:spTree>
   </p:cSld>
   <p:clrMapOvr>
@@ -8081,7 +7429,7 @@
             </a:pPr>
             <a:r>
               <a:rPr lang="en"/>
-              <a:t>Sprint 1 Plan</a:t>
+              <a:t>Project Requirements</a:t>
             </a:r>
             <a:endParaRPr/>
           </a:p>
@@ -8110,122 +7458,131 @@
           </a:bodyPr>
           <a:lstStyle/>
           <a:p>
-            <a:pPr indent="0" lvl="0" marL="0" rtl="0" algn="l">
-              <a:spcBef>
-                <a:spcPts val="0"/>
-              </a:spcBef>
-              <a:spcAft>
-                <a:spcPts val="0"/>
-              </a:spcAft>
-              <a:buNone/>
-            </a:pPr>
-            <a:r>
-              <a:rPr lang="en" sz="1500"/>
-              <a:t>Our main goals for this sprint included devising a general project plan/sprint schedule, establishing the scope of the project, and deciding on the languages and libraries we wanted to use for each component. We decided much of this in team meetings, and divided the tasks as follows:  </a:t>
-            </a:r>
-            <a:endParaRPr sz="1500"/>
-          </a:p>
-          <a:p>
-            <a:pPr indent="-323850" lvl="0" marL="457200" rtl="0" algn="l">
-              <a:spcBef>
-                <a:spcPts val="1600"/>
-              </a:spcBef>
-              <a:spcAft>
-                <a:spcPts val="0"/>
-              </a:spcAft>
-              <a:buSzPts val="1500"/>
+            <a:pPr indent="-342900" lvl="0" marL="457200" rtl="0" algn="l">
+              <a:spcBef>
+                <a:spcPts val="0"/>
+              </a:spcBef>
+              <a:spcAft>
+                <a:spcPts val="0"/>
+              </a:spcAft>
+              <a:buSzPts val="1800"/>
               <a:buChar char="●"/>
             </a:pPr>
             <a:r>
-              <a:rPr lang="en" sz="1500"/>
-              <a:t>Jacob - Condensing ideas into presentation, database E.R. diagram</a:t>
+              <a:rPr lang="en"/>
+              <a:t>Web Server hosting a MySQL database for user information storage. This database will be accessed by both the app and the API.</a:t>
             </a:r>
-            <a:endParaRPr sz="1500"/>
+            <a:endParaRPr/>
           </a:p>
           <a:p>
-            <a:pPr indent="-323850" lvl="0" marL="457200" rtl="0" algn="l">
-              <a:spcBef>
-                <a:spcPts val="0"/>
-              </a:spcBef>
-              <a:spcAft>
-                <a:spcPts val="0"/>
-              </a:spcAft>
-              <a:buSzPts val="1500"/>
+            <a:pPr indent="-342900" lvl="0" marL="457200" rtl="0" algn="l">
+              <a:spcBef>
+                <a:spcPts val="0"/>
+              </a:spcBef>
+              <a:spcAft>
+                <a:spcPts val="0"/>
+              </a:spcAft>
+              <a:buSzPts val="1800"/>
               <a:buChar char="●"/>
             </a:pPr>
             <a:r>
-              <a:rPr lang="en" sz="1500"/>
-              <a:t>Nick - Research and selection of  APIs</a:t>
+              <a:rPr lang="en"/>
+              <a:t>Android app with user registration/login and </a:t>
             </a:r>
-            <a:endParaRPr sz="1500"/>
+            <a:r>
+              <a:rPr lang="en"/>
+              <a:t>profile configuration</a:t>
+            </a:r>
+            <a:endParaRPr/>
           </a:p>
           <a:p>
-            <a:pPr indent="-323850" lvl="0" marL="457200" rtl="0" algn="l">
-              <a:spcBef>
-                <a:spcPts val="0"/>
-              </a:spcBef>
-              <a:spcAft>
-                <a:spcPts val="0"/>
-              </a:spcAft>
-              <a:buSzPts val="1500"/>
+            <a:pPr indent="-342900" lvl="0" marL="457200" rtl="0" algn="l">
+              <a:spcBef>
+                <a:spcPts val="0"/>
+              </a:spcBef>
+              <a:spcAft>
+                <a:spcPts val="0"/>
+              </a:spcAft>
+              <a:buSzPts val="1800"/>
               <a:buChar char="●"/>
             </a:pPr>
             <a:r>
-              <a:rPr lang="en" sz="1500"/>
-              <a:t>Alex - UI Design</a:t>
+              <a:rPr lang="en"/>
+              <a:t>API that uses OAuth 2.0 to allow user authorization via the following technologies:</a:t>
             </a:r>
-            <a:endParaRPr sz="1500"/>
+            <a:endParaRPr/>
           </a:p>
           <a:p>
-            <a:pPr indent="-323850" lvl="0" marL="457200" rtl="0" algn="l">
-              <a:spcBef>
-                <a:spcPts val="0"/>
-              </a:spcBef>
-              <a:spcAft>
-                <a:spcPts val="0"/>
-              </a:spcAft>
-              <a:buSzPts val="1500"/>
-              <a:buChar char="●"/>
+            <a:pPr indent="-317500" lvl="1" marL="914400" rtl="0" algn="l">
+              <a:spcBef>
+                <a:spcPts val="0"/>
+              </a:spcBef>
+              <a:spcAft>
+                <a:spcPts val="0"/>
+              </a:spcAft>
+              <a:buSzPts val="1400"/>
+              <a:buChar char="○"/>
             </a:pPr>
             <a:r>
-              <a:rPr lang="en" sz="1500"/>
-              <a:t>Steven - Motivation and Vision, Sprint Plan</a:t>
+              <a:rPr lang="en"/>
+              <a:t>Facial recognition</a:t>
             </a:r>
-            <a:endParaRPr sz="1500"/>
+            <a:endParaRPr/>
           </a:p>
           <a:p>
-            <a:pPr indent="-323850" lvl="0" marL="457200" rtl="0" algn="l">
-              <a:spcBef>
-                <a:spcPts val="0"/>
-              </a:spcBef>
-              <a:spcAft>
-                <a:spcPts val="0"/>
-              </a:spcAft>
-              <a:buSzPts val="1500"/>
-              <a:buChar char="●"/>
+            <a:pPr indent="-317500" lvl="1" marL="914400" rtl="0" algn="l">
+              <a:spcBef>
+                <a:spcPts val="0"/>
+              </a:spcBef>
+              <a:spcAft>
+                <a:spcPts val="0"/>
+              </a:spcAft>
+              <a:buSzPts val="1400"/>
+              <a:buChar char="○"/>
             </a:pPr>
             <a:r>
-              <a:rPr lang="en" sz="1500"/>
-              <a:t>Samuel - Project Requirements</a:t>
+              <a:rPr lang="en"/>
+              <a:t>Iris authentication</a:t>
             </a:r>
-            <a:endParaRPr sz="1500"/>
+            <a:endParaRPr/>
           </a:p>
           <a:p>
-            <a:pPr indent="-323850" lvl="0" marL="457200" rtl="0" algn="l">
-              <a:spcBef>
-                <a:spcPts val="0"/>
-              </a:spcBef>
-              <a:spcAft>
-                <a:spcPts val="0"/>
-              </a:spcAft>
-              <a:buSzPts val="1500"/>
-              <a:buChar char="●"/>
+            <a:pPr indent="-317500" lvl="1" marL="914400" rtl="0" algn="l">
+              <a:spcBef>
+                <a:spcPts val="0"/>
+              </a:spcBef>
+              <a:spcAft>
+                <a:spcPts val="0"/>
+              </a:spcAft>
+              <a:buSzPts val="1400"/>
+              <a:buChar char="○"/>
             </a:pPr>
             <a:r>
-              <a:rPr lang="en" sz="1500"/>
-              <a:t>Andy- Risk Analysis and Challenges</a:t>
+              <a:rPr lang="en"/>
+              <a:t>Fingerprint analysis</a:t>
             </a:r>
-            <a:endParaRPr sz="1500"/>
+            <a:endParaRPr/>
+          </a:p>
+          <a:p>
+            <a:pPr indent="-317500" lvl="1" marL="914400" rtl="0" algn="l">
+              <a:spcBef>
+                <a:spcPts val="0"/>
+              </a:spcBef>
+              <a:spcAft>
+                <a:spcPts val="0"/>
+              </a:spcAft>
+              <a:buSzPts val="1400"/>
+              <a:buChar char="○"/>
+            </a:pPr>
+            <a:r>
+              <a:rPr lang="en"/>
+              <a:t>Voice </a:t>
+            </a:r>
+            <a:r>
+              <a:rPr lang="en"/>
+              <a:t>recognition</a:t>
+            </a:r>
+            <a:endParaRPr/>
           </a:p>
         </p:txBody>
       </p:sp>
@@ -8288,7 +7645,7 @@
             </a:pPr>
             <a:r>
               <a:rPr lang="en"/>
-              <a:t>Project Requirements</a:t>
+              <a:t>Tool Chain</a:t>
             </a:r>
             <a:endParaRPr/>
           </a:p>
@@ -8329,7 +7686,7 @@
             </a:pPr>
             <a:r>
               <a:rPr lang="en"/>
-              <a:t>Web Server hosting a MySQL database for user information storage. This database will be accessed by both the app and the API.</a:t>
+              <a:t>Github (code version control, collaboration)</a:t>
             </a:r>
             <a:endParaRPr/>
           </a:p>
@@ -8346,11 +7703,7 @@
             </a:pPr>
             <a:r>
               <a:rPr lang="en"/>
-              <a:t>Android app with user registration/login and </a:t>
-            </a:r>
-            <a:r>
-              <a:rPr lang="en"/>
-              <a:t>profile configuration</a:t>
+              <a:t>Java (Android app)</a:t>
             </a:r>
             <a:endParaRPr/>
           </a:p>
@@ -8367,79 +7720,94 @@
             </a:pPr>
             <a:r>
               <a:rPr lang="en"/>
-              <a:t>API that uses OAuth 2.0 to allow user authorization via the following technologies:</a:t>
+              <a:t>MySQL (Database)</a:t>
             </a:r>
             <a:endParaRPr/>
           </a:p>
           <a:p>
-            <a:pPr indent="-317500" lvl="1" marL="914400" rtl="0" algn="l">
-              <a:spcBef>
-                <a:spcPts val="0"/>
-              </a:spcBef>
-              <a:spcAft>
-                <a:spcPts val="0"/>
-              </a:spcAft>
-              <a:buSzPts val="1400"/>
-              <a:buChar char="○"/>
+            <a:pPr indent="-342900" lvl="0" marL="457200" rtl="0" algn="l">
+              <a:spcBef>
+                <a:spcPts val="0"/>
+              </a:spcBef>
+              <a:spcAft>
+                <a:spcPts val="0"/>
+              </a:spcAft>
+              <a:buSzPts val="1800"/>
+              <a:buChar char="●"/>
             </a:pPr>
             <a:r>
               <a:rPr lang="en"/>
-              <a:t>Facial recognition</a:t>
+              <a:t>Biometric API for facial recognition, fingerprint authentication, and iris recognition</a:t>
             </a:r>
-            <a:endParaRPr/>
+            <a:r>
+              <a:rPr lang="en"/>
+              <a:t>  </a:t>
+            </a:r>
+            <a:r>
+              <a:rPr lang="en" sz="1200"/>
+              <a:t>(</a:t>
+            </a:r>
+            <a:r>
+              <a:rPr lang="en" sz="1200" u="sng">
+                <a:solidFill>
+                  <a:schemeClr val="hlink"/>
+                </a:solidFill>
+                <a:hlinkClick r:id="rId3"/>
+              </a:rPr>
+              <a:t>https://developer.android.com/reference/android/hardware/biometrics/package-summary</a:t>
+            </a:r>
+            <a:r>
+              <a:rPr lang="en" sz="1200"/>
+              <a:t>)</a:t>
+            </a:r>
+            <a:endParaRPr sz="1200"/>
           </a:p>
           <a:p>
-            <a:pPr indent="-317500" lvl="1" marL="914400" rtl="0" algn="l">
-              <a:spcBef>
-                <a:spcPts val="0"/>
-              </a:spcBef>
-              <a:spcAft>
-                <a:spcPts val="0"/>
-              </a:spcAft>
-              <a:buSzPts val="1400"/>
-              <a:buChar char="○"/>
+            <a:pPr indent="-342900" lvl="0" marL="457200" rtl="0" algn="l">
+              <a:spcBef>
+                <a:spcPts val="0"/>
+              </a:spcBef>
+              <a:spcAft>
+                <a:spcPts val="0"/>
+              </a:spcAft>
+              <a:buSzPts val="1800"/>
+              <a:buChar char="●"/>
             </a:pPr>
             <a:r>
               <a:rPr lang="en"/>
-              <a:t>Iris authentication</a:t>
+              <a:t>SpeechRecognizer API for speech recognition </a:t>
             </a:r>
-            <a:endParaRPr/>
+            <a:r>
+              <a:rPr lang="en" sz="1200"/>
+              <a:t>(</a:t>
+            </a:r>
+            <a:r>
+              <a:rPr lang="en" sz="1200" u="sng">
+                <a:solidFill>
+                  <a:schemeClr val="hlink"/>
+                </a:solidFill>
+                <a:hlinkClick r:id="rId4"/>
+              </a:rPr>
+              <a:t>https://developer.android.com/reference/android/speech/SpeechRecognizer</a:t>
+            </a:r>
+            <a:r>
+              <a:rPr lang="en" sz="1200"/>
+              <a:t>) </a:t>
+            </a:r>
+            <a:endParaRPr sz="1200"/>
           </a:p>
           <a:p>
-            <a:pPr indent="-317500" lvl="1" marL="914400" rtl="0" algn="l">
-              <a:spcBef>
-                <a:spcPts val="0"/>
-              </a:spcBef>
-              <a:spcAft>
-                <a:spcPts val="0"/>
-              </a:spcAft>
-              <a:buSzPts val="1400"/>
-              <a:buChar char="○"/>
+            <a:pPr indent="0" lvl="0" marL="457200" rtl="0" algn="l">
+              <a:spcBef>
+                <a:spcPts val="1600"/>
+              </a:spcBef>
+              <a:spcAft>
+                <a:spcPts val="1600"/>
+              </a:spcAft>
+              <a:buNone/>
             </a:pPr>
             <a:r>
-              <a:rPr lang="en"/>
-              <a:t>Fingerprint analysis</a:t>
-            </a:r>
-            <a:endParaRPr/>
-          </a:p>
-          <a:p>
-            <a:pPr indent="-317500" lvl="1" marL="914400" rtl="0" algn="l">
-              <a:spcBef>
-                <a:spcPts val="0"/>
-              </a:spcBef>
-              <a:spcAft>
-                <a:spcPts val="0"/>
-              </a:spcAft>
-              <a:buSzPts val="1400"/>
-              <a:buChar char="○"/>
-            </a:pPr>
-            <a:r>
-              <a:rPr lang="en"/>
-              <a:t>Voice </a:t>
-            </a:r>
-            <a:r>
-              <a:rPr lang="en"/>
-              <a:t>recognition</a:t>
+              <a:t/>
             </a:r>
             <a:endParaRPr/>
           </a:p>
@@ -8504,7 +7872,7 @@
             </a:pPr>
             <a:r>
               <a:rPr lang="en"/>
-              <a:t>Application Use Scenarios</a:t>
+              <a:t>Risk Analysis</a:t>
             </a:r>
             <a:endParaRPr/>
           </a:p>
@@ -8545,7 +7913,15 @@
             </a:pPr>
             <a:r>
               <a:rPr lang="en"/>
-              <a:t>Any system with sensitive information and high security requirements as a result</a:t>
+              <a:t>Unfamiliarity with software </a:t>
+            </a:r>
+            <a:r>
+              <a:rPr lang="en"/>
+              <a:t>environment</a:t>
+            </a:r>
+            <a:r>
+              <a:rPr lang="en"/>
+              <a:t> </a:t>
             </a:r>
             <a:endParaRPr/>
           </a:p>
@@ -8562,7 +7938,7 @@
             </a:pPr>
             <a:r>
               <a:rPr lang="en"/>
-              <a:t>Developers looking for login alternatives to circumvent the use of passwords altogether</a:t>
+              <a:t>Missing deadlines </a:t>
             </a:r>
             <a:endParaRPr/>
           </a:p>
@@ -8579,15 +7955,49 @@
             </a:pPr>
             <a:r>
               <a:rPr lang="en"/>
-              <a:t>Organizations looking to increase the </a:t>
+              <a:t>Group members drop out of class</a:t>
+            </a:r>
+            <a:endParaRPr/>
+          </a:p>
+          <a:p>
+            <a:pPr indent="-342900" lvl="0" marL="457200" rtl="0" algn="l">
+              <a:spcBef>
+                <a:spcPts val="0"/>
+              </a:spcBef>
+              <a:spcAft>
+                <a:spcPts val="0"/>
+              </a:spcAft>
+              <a:buSzPts val="1800"/>
+              <a:buChar char="●"/>
+            </a:pPr>
+            <a:r>
+              <a:rPr lang="en"/>
+              <a:t>We are working with sensitive information, and therefore must value security very highly when creating this product</a:t>
+            </a:r>
+            <a:endParaRPr/>
+          </a:p>
+          <a:p>
+            <a:pPr indent="-342900" lvl="0" marL="457200" rtl="0" algn="l">
+              <a:spcBef>
+                <a:spcPts val="0"/>
+              </a:spcBef>
+              <a:spcAft>
+                <a:spcPts val="0"/>
+              </a:spcAft>
+              <a:buSzPts val="1800"/>
+              <a:buChar char="●"/>
+            </a:pPr>
+            <a:r>
+              <a:rPr lang="en"/>
+              <a:t>Preventing </a:t>
             </a:r>
             <a:r>
               <a:rPr lang="en"/>
-              <a:t>perceived</a:t>
+              <a:t>fraudulent</a:t>
             </a:r>
             <a:r>
               <a:rPr lang="en"/>
-              <a:t> legitimacy by using cutting edge technology and adding a slightly higher barrier to entry</a:t>
+              <a:t> sign-ins (using a picture, audio clip, etc.)  </a:t>
             </a:r>
             <a:endParaRPr/>
           </a:p>
@@ -8652,7 +8062,7 @@
             </a:pPr>
             <a:r>
               <a:rPr lang="en"/>
-              <a:t>Risk Analysis</a:t>
+              <a:t>Challenges</a:t>
             </a:r>
             <a:endParaRPr/>
           </a:p>
@@ -8668,7 +8078,7 @@
         </p:nvSpPr>
         <p:spPr>
           <a:xfrm>
-            <a:off x="387900" y="1489824"/>
+            <a:off x="387900" y="1457674"/>
             <a:ext cx="8368200" cy="3078900"/>
           </a:xfrm>
           <a:prstGeom prst="rect">
@@ -8693,15 +8103,7 @@
             </a:pPr>
             <a:r>
               <a:rPr lang="en"/>
-              <a:t>Unfamiliarity with software </a:t>
-            </a:r>
-            <a:r>
-              <a:rPr lang="en"/>
-              <a:t>environment</a:t>
-            </a:r>
-            <a:r>
-              <a:rPr lang="en"/>
-              <a:t> </a:t>
+              <a:t>Distanced Communication and work</a:t>
             </a:r>
             <a:endParaRPr/>
           </a:p>
@@ -8718,7 +8120,7 @@
             </a:pPr>
             <a:r>
               <a:rPr lang="en"/>
-              <a:t>Missing deadlines </a:t>
+              <a:t>Learning the interaction between languages </a:t>
             </a:r>
             <a:endParaRPr/>
           </a:p>
@@ -8735,7 +8137,11 @@
             </a:pPr>
             <a:r>
               <a:rPr lang="en"/>
-              <a:t>Group members drop out of class</a:t>
+              <a:t>Making the login </a:t>
+            </a:r>
+            <a:r>
+              <a:rPr lang="en"/>
+              <a:t>system work for every different authorization technology</a:t>
             </a:r>
             <a:endParaRPr/>
           </a:p>
@@ -8752,32 +8158,7 @@
             </a:pPr>
             <a:r>
               <a:rPr lang="en"/>
-              <a:t>We are working with sensitive information, and therefore must value security very highly when creating this product</a:t>
-            </a:r>
-            <a:endParaRPr/>
-          </a:p>
-          <a:p>
-            <a:pPr indent="-342900" lvl="0" marL="457200" rtl="0" algn="l">
-              <a:spcBef>
-                <a:spcPts val="0"/>
-              </a:spcBef>
-              <a:spcAft>
-                <a:spcPts val="0"/>
-              </a:spcAft>
-              <a:buSzPts val="1800"/>
-              <a:buChar char="●"/>
-            </a:pPr>
-            <a:r>
-              <a:rPr lang="en"/>
-              <a:t>Preventing </a:t>
-            </a:r>
-            <a:r>
-              <a:rPr lang="en"/>
-              <a:t>fraudulent</a:t>
-            </a:r>
-            <a:r>
-              <a:rPr lang="en"/>
-              <a:t> sign-ins (using a picture, audio clip, etc.)  </a:t>
+              <a:t>Getting everyone on the same schedule and meeting regularly to keep everyone on the same page</a:t>
             </a:r>
             <a:endParaRPr/>
           </a:p>
@@ -8842,7 +8223,7 @@
             </a:pPr>
             <a:r>
               <a:rPr lang="en"/>
-              <a:t>Challenges</a:t>
+              <a:t>Sprint 1 Plan</a:t>
             </a:r>
             <a:endParaRPr/>
           </a:p>
@@ -8858,7 +8239,7 @@
         </p:nvSpPr>
         <p:spPr>
           <a:xfrm>
-            <a:off x="387900" y="1457674"/>
+            <a:off x="387900" y="1489824"/>
             <a:ext cx="8368200" cy="3078900"/>
           </a:xfrm>
           <a:prstGeom prst="rect">
@@ -8871,76 +8252,126 @@
           </a:bodyPr>
           <a:lstStyle/>
           <a:p>
-            <a:pPr indent="-342900" lvl="0" marL="457200" rtl="0" algn="l">
-              <a:spcBef>
-                <a:spcPts val="0"/>
-              </a:spcBef>
-              <a:spcAft>
-                <a:spcPts val="0"/>
-              </a:spcAft>
-              <a:buSzPts val="1800"/>
+            <a:pPr indent="0" lvl="0" marL="0" rtl="0" algn="l">
+              <a:spcBef>
+                <a:spcPts val="0"/>
+              </a:spcBef>
+              <a:spcAft>
+                <a:spcPts val="0"/>
+              </a:spcAft>
+              <a:buNone/>
+            </a:pPr>
+            <a:r>
+              <a:rPr lang="en" sz="1500"/>
+              <a:t>Our main goals for this sprint included devising a general project plan/sprint schedule, establishing the scope of the project, and deciding on the languages and libraries we wanted to use for each component. We decided much of this in team meetings, and divided the tasks as follows:  </a:t>
+            </a:r>
+            <a:endParaRPr sz="1500"/>
+          </a:p>
+          <a:p>
+            <a:pPr indent="-323850" lvl="0" marL="457200" rtl="0" algn="l">
+              <a:spcBef>
+                <a:spcPts val="1600"/>
+              </a:spcBef>
+              <a:spcAft>
+                <a:spcPts val="0"/>
+              </a:spcAft>
+              <a:buSzPts val="1500"/>
               <a:buChar char="●"/>
             </a:pPr>
             <a:r>
-              <a:rPr lang="en"/>
-              <a:t>Distanced Communication and work</a:t>
+              <a:rPr lang="en" sz="1500"/>
+              <a:t>Jacob - Condensing ideas into presentation, </a:t>
             </a:r>
-            <a:endParaRPr/>
+            <a:r>
+              <a:rPr lang="en" sz="1500"/>
+              <a:t>initial database considerations</a:t>
+            </a:r>
+            <a:endParaRPr sz="1500"/>
           </a:p>
           <a:p>
-            <a:pPr indent="-342900" lvl="0" marL="457200" rtl="0" algn="l">
-              <a:spcBef>
-                <a:spcPts val="0"/>
-              </a:spcBef>
-              <a:spcAft>
-                <a:spcPts val="0"/>
-              </a:spcAft>
-              <a:buSzPts val="1800"/>
+            <a:pPr indent="-323850" lvl="0" marL="457200" rtl="0" algn="l">
+              <a:spcBef>
+                <a:spcPts val="0"/>
+              </a:spcBef>
+              <a:spcAft>
+                <a:spcPts val="0"/>
+              </a:spcAft>
+              <a:buSzPts val="1500"/>
               <a:buChar char="●"/>
             </a:pPr>
             <a:r>
-              <a:rPr lang="en"/>
-              <a:t>Learning the interaction between languages </a:t>
+              <a:rPr lang="en" sz="1500"/>
+              <a:t>Nick - Research and selection of APIs</a:t>
             </a:r>
-            <a:endParaRPr/>
+            <a:endParaRPr sz="1500"/>
           </a:p>
           <a:p>
-            <a:pPr indent="-342900" lvl="0" marL="457200" rtl="0" algn="l">
-              <a:spcBef>
-                <a:spcPts val="0"/>
-              </a:spcBef>
-              <a:spcAft>
-                <a:spcPts val="0"/>
-              </a:spcAft>
-              <a:buSzPts val="1800"/>
+            <a:pPr indent="-323850" lvl="0" marL="457200" rtl="0" algn="l">
+              <a:spcBef>
+                <a:spcPts val="0"/>
+              </a:spcBef>
+              <a:spcAft>
+                <a:spcPts val="0"/>
+              </a:spcAft>
+              <a:buSzPts val="1500"/>
               <a:buChar char="●"/>
             </a:pPr>
             <a:r>
-              <a:rPr lang="en"/>
-              <a:t>Making the login </a:t>
+              <a:rPr lang="en" sz="1500"/>
+              <a:t>Alex - UI Design</a:t>
             </a:r>
-            <a:r>
-              <a:rPr lang="en"/>
-              <a:t>system work for every different authorization technology</a:t>
-            </a:r>
-            <a:endParaRPr/>
+            <a:endParaRPr sz="1500"/>
           </a:p>
           <a:p>
-            <a:pPr indent="-342900" lvl="0" marL="457200" rtl="0" algn="l">
-              <a:spcBef>
-                <a:spcPts val="0"/>
-              </a:spcBef>
-              <a:spcAft>
-                <a:spcPts val="0"/>
-              </a:spcAft>
-              <a:buSzPts val="1800"/>
+            <a:pPr indent="-323850" lvl="0" marL="457200" rtl="0" algn="l">
+              <a:spcBef>
+                <a:spcPts val="0"/>
+              </a:spcBef>
+              <a:spcAft>
+                <a:spcPts val="0"/>
+              </a:spcAft>
+              <a:buSzPts val="1500"/>
               <a:buChar char="●"/>
             </a:pPr>
             <a:r>
-              <a:rPr lang="en"/>
-              <a:t>Getting everyone on the same schedule and meeting regularly to keep everyone on the same page</a:t>
+              <a:rPr lang="en" sz="1500"/>
+              <a:t>Steven - Motivation and Vision, Sprint Plan</a:t>
             </a:r>
-            <a:endParaRPr/>
+            <a:endParaRPr sz="1500"/>
+          </a:p>
+          <a:p>
+            <a:pPr indent="-323850" lvl="0" marL="457200" rtl="0" algn="l">
+              <a:spcBef>
+                <a:spcPts val="0"/>
+              </a:spcBef>
+              <a:spcAft>
+                <a:spcPts val="0"/>
+              </a:spcAft>
+              <a:buSzPts val="1500"/>
+              <a:buChar char="●"/>
+            </a:pPr>
+            <a:r>
+              <a:rPr lang="en" sz="1500"/>
+              <a:t>Samuel - Project Requirements</a:t>
+            </a:r>
+            <a:endParaRPr sz="1500"/>
+          </a:p>
+          <a:p>
+            <a:pPr indent="-323850" lvl="0" marL="457200" rtl="0" algn="l">
+              <a:spcBef>
+                <a:spcPts val="0"/>
+              </a:spcBef>
+              <a:spcAft>
+                <a:spcPts val="0"/>
+              </a:spcAft>
+              <a:buSzPts val="1500"/>
+              <a:buChar char="●"/>
+            </a:pPr>
+            <a:r>
+              <a:rPr lang="en" sz="1500"/>
+              <a:t>Andy- Risk Analysis and Challenges</a:t>
+            </a:r>
+            <a:endParaRPr sz="1500"/>
           </a:p>
         </p:txBody>
       </p:sp>
@@ -9003,7 +8434,7 @@
             </a:pPr>
             <a:r>
               <a:rPr lang="en"/>
-              <a:t>Tool Chain</a:t>
+              <a:t>Sprint Schedule</a:t>
             </a:r>
             <a:endParaRPr/>
           </a:p>
@@ -9019,8 +8450,8 @@
         </p:nvSpPr>
         <p:spPr>
           <a:xfrm>
-            <a:off x="387900" y="1489824"/>
-            <a:ext cx="8368200" cy="3078900"/>
+            <a:off x="387900" y="1489825"/>
+            <a:ext cx="3999900" cy="3078900"/>
           </a:xfrm>
           <a:prstGeom prst="rect">
             <a:avLst/>
@@ -9032,140 +8463,200 @@
           </a:bodyPr>
           <a:lstStyle/>
           <a:p>
-            <a:pPr indent="-342900" lvl="0" marL="457200" rtl="0" algn="l">
-              <a:spcBef>
-                <a:spcPts val="0"/>
-              </a:spcBef>
-              <a:spcAft>
-                <a:spcPts val="0"/>
-              </a:spcAft>
-              <a:buSzPts val="1800"/>
-              <a:buChar char="●"/>
+            <a:pPr indent="-317500" lvl="0" marL="457200" rtl="0" algn="l">
+              <a:lnSpc>
+                <a:spcPct val="200000"/>
+              </a:lnSpc>
+              <a:spcBef>
+                <a:spcPts val="0"/>
+              </a:spcBef>
+              <a:spcAft>
+                <a:spcPts val="0"/>
+              </a:spcAft>
+              <a:buSzPts val="1400"/>
+              <a:buAutoNum type="arabicPeriod"/>
             </a:pPr>
             <a:r>
               <a:rPr lang="en"/>
-              <a:t>Github (code version control, collaboration)</a:t>
+              <a:t>Project Details and Requirements</a:t>
             </a:r>
             <a:endParaRPr/>
           </a:p>
           <a:p>
-            <a:pPr indent="-342900" lvl="0" marL="457200" rtl="0" algn="l">
-              <a:spcBef>
-                <a:spcPts val="0"/>
-              </a:spcBef>
-              <a:spcAft>
-                <a:spcPts val="0"/>
-              </a:spcAft>
-              <a:buSzPts val="1800"/>
-              <a:buChar char="●"/>
+            <a:pPr indent="-317500" lvl="0" marL="457200" rtl="0" algn="l">
+              <a:lnSpc>
+                <a:spcPct val="200000"/>
+              </a:lnSpc>
+              <a:spcBef>
+                <a:spcPts val="0"/>
+              </a:spcBef>
+              <a:spcAft>
+                <a:spcPts val="0"/>
+              </a:spcAft>
+              <a:buSzPts val="1400"/>
+              <a:buAutoNum type="arabicPeriod"/>
             </a:pPr>
             <a:r>
               <a:rPr lang="en"/>
-              <a:t>Java (Android app)</a:t>
+              <a:t>User Account Creation (Jan 21st - 25th)</a:t>
             </a:r>
             <a:endParaRPr/>
           </a:p>
           <a:p>
-            <a:pPr indent="-342900" lvl="0" marL="457200" rtl="0" algn="l">
-              <a:spcBef>
-                <a:spcPts val="0"/>
-              </a:spcBef>
-              <a:spcAft>
-                <a:spcPts val="0"/>
-              </a:spcAft>
-              <a:buSzPts val="1800"/>
-              <a:buChar char="●"/>
+            <a:pPr indent="-317500" lvl="0" marL="457200" rtl="0" algn="l">
+              <a:lnSpc>
+                <a:spcPct val="200000"/>
+              </a:lnSpc>
+              <a:spcBef>
+                <a:spcPts val="0"/>
+              </a:spcBef>
+              <a:spcAft>
+                <a:spcPts val="0"/>
+              </a:spcAft>
+              <a:buSzPts val="1400"/>
+              <a:buAutoNum type="arabicPeriod"/>
             </a:pPr>
             <a:r>
               <a:rPr lang="en"/>
-              <a:t>MySQL (Database)</a:t>
+              <a:t>Facial Recognition (Jan 26th - Feb 8th)</a:t>
             </a:r>
             <a:endParaRPr/>
           </a:p>
           <a:p>
-            <a:pPr indent="-342900" lvl="0" marL="457200" rtl="0" algn="l">
-              <a:spcBef>
-                <a:spcPts val="0"/>
-              </a:spcBef>
-              <a:spcAft>
-                <a:spcPts val="0"/>
-              </a:spcAft>
-              <a:buSzPts val="1800"/>
-              <a:buChar char="●"/>
+            <a:pPr indent="-317500" lvl="0" marL="457200" rtl="0" algn="l">
+              <a:lnSpc>
+                <a:spcPct val="200000"/>
+              </a:lnSpc>
+              <a:spcBef>
+                <a:spcPts val="0"/>
+              </a:spcBef>
+              <a:spcAft>
+                <a:spcPts val="0"/>
+              </a:spcAft>
+              <a:buSzPts val="1400"/>
+              <a:buAutoNum type="arabicPeriod"/>
             </a:pPr>
             <a:r>
               <a:rPr lang="en"/>
-              <a:t>Biometric API for facial recognition, fingerprint authentication, and iris recognition</a:t>
+              <a:t>Iris Recognition (Feb 9th - 15th)</a:t>
             </a:r>
-            <a:r>
-              <a:rPr lang="en"/>
-              <a:t>  </a:t>
-            </a:r>
-            <a:r>
-              <a:rPr lang="en" sz="1200"/>
-              <a:t>(</a:t>
-            </a:r>
-            <a:r>
-              <a:rPr lang="en" sz="1200" u="sng">
-                <a:solidFill>
-                  <a:schemeClr val="hlink"/>
-                </a:solidFill>
-                <a:hlinkClick r:id="rId3"/>
-              </a:rPr>
-              <a:t>https://developer.android.com/reference/android/hardware/biometrics/package-summary</a:t>
-            </a:r>
-            <a:r>
-              <a:rPr lang="en" sz="1200"/>
-              <a:t>)</a:t>
-            </a:r>
-            <a:endParaRPr sz="1200"/>
+            <a:endParaRPr/>
           </a:p>
           <a:p>
-            <a:pPr indent="-342900" lvl="0" marL="457200" rtl="0" algn="l">
-              <a:spcBef>
-                <a:spcPts val="0"/>
-              </a:spcBef>
-              <a:spcAft>
-                <a:spcPts val="0"/>
-              </a:spcAft>
-              <a:buSzPts val="1800"/>
-              <a:buChar char="●"/>
+            <a:pPr indent="-317500" lvl="0" marL="457200" rtl="0" algn="l">
+              <a:lnSpc>
+                <a:spcPct val="200000"/>
+              </a:lnSpc>
+              <a:spcBef>
+                <a:spcPts val="0"/>
+              </a:spcBef>
+              <a:spcAft>
+                <a:spcPts val="0"/>
+              </a:spcAft>
+              <a:buSzPts val="1400"/>
+              <a:buAutoNum type="arabicPeriod"/>
             </a:pPr>
             <a:r>
               <a:rPr lang="en"/>
-              <a:t>SpeechRecognizer API for speech recognition </a:t>
+              <a:t>Fingerprints (Feb 16th - March 1st)</a:t>
             </a:r>
-            <a:r>
-              <a:rPr lang="en" sz="1200"/>
-              <a:t>(</a:t>
-            </a:r>
-            <a:r>
-              <a:rPr lang="en" sz="1200" u="sng">
-                <a:solidFill>
-                  <a:schemeClr val="hlink"/>
-                </a:solidFill>
-                <a:hlinkClick r:id="rId4"/>
-              </a:rPr>
-              <a:t>https://developer.android.com/reference/android/speech/SpeechRecognizer</a:t>
-            </a:r>
-            <a:r>
-              <a:rPr lang="en" sz="1200"/>
-              <a:t>) </a:t>
-            </a:r>
-            <a:endParaRPr sz="1200"/>
+            <a:endParaRPr/>
           </a:p>
           <a:p>
-            <a:pPr indent="0" lvl="0" marL="457200" rtl="0" algn="l">
-              <a:spcBef>
-                <a:spcPts val="1600"/>
-              </a:spcBef>
-              <a:spcAft>
-                <a:spcPts val="1600"/>
-              </a:spcAft>
-              <a:buNone/>
+            <a:pPr indent="-317500" lvl="0" marL="457200" rtl="0" algn="l">
+              <a:spcBef>
+                <a:spcPts val="0"/>
+              </a:spcBef>
+              <a:spcAft>
+                <a:spcPts val="0"/>
+              </a:spcAft>
+              <a:buSzPts val="1400"/>
+              <a:buAutoNum type="arabicPeriod"/>
             </a:pPr>
             <a:r>
-              <a:t/>
+              <a:rPr lang="en"/>
+              <a:t>Voice Detection (March 2nd - 15th)</a:t>
+            </a:r>
+            <a:endParaRPr/>
+          </a:p>
+        </p:txBody>
+      </p:sp>
+      <p:sp>
+        <p:nvSpPr>
+          <p:cNvPr id="107" name="Google Shape;107;p20"/>
+          <p:cNvSpPr txBox="1"/>
+          <p:nvPr>
+            <p:ph idx="2" type="body"/>
+          </p:nvPr>
+        </p:nvSpPr>
+        <p:spPr>
+          <a:xfrm>
+            <a:off x="4756200" y="1489825"/>
+            <a:ext cx="3999900" cy="3078900"/>
+          </a:xfrm>
+          <a:prstGeom prst="rect">
+            <a:avLst/>
+          </a:prstGeom>
+        </p:spPr>
+        <p:txBody>
+          <a:bodyPr anchorCtr="0" anchor="t" bIns="91425" lIns="91425" spcFirstLastPara="1" rIns="91425" wrap="square" tIns="91425">
+            <a:noAutofit/>
+          </a:bodyPr>
+          <a:lstStyle/>
+          <a:p>
+            <a:pPr indent="-317500" lvl="0" marL="457200" rtl="0" algn="l">
+              <a:lnSpc>
+                <a:spcPct val="200000"/>
+              </a:lnSpc>
+              <a:spcBef>
+                <a:spcPts val="0"/>
+              </a:spcBef>
+              <a:spcAft>
+                <a:spcPts val="0"/>
+              </a:spcAft>
+              <a:buSzPts val="1400"/>
+              <a:buAutoNum type="arabicPeriod" startAt="7"/>
+            </a:pPr>
+            <a:r>
+              <a:rPr lang="en"/>
+              <a:t>Oauth Integration (March 16th - 29th)</a:t>
+            </a:r>
+            <a:endParaRPr/>
+          </a:p>
+          <a:p>
+            <a:pPr indent="-317500" lvl="0" marL="457200" rtl="0" algn="l">
+              <a:lnSpc>
+                <a:spcPct val="200000"/>
+              </a:lnSpc>
+              <a:spcBef>
+                <a:spcPts val="0"/>
+              </a:spcBef>
+              <a:spcAft>
+                <a:spcPts val="0"/>
+              </a:spcAft>
+              <a:buSzPts val="1400"/>
+              <a:buAutoNum type="arabicPeriod" startAt="7"/>
+            </a:pPr>
+            <a:r>
+              <a:rPr lang="en"/>
+              <a:t>Stretch Goals (March 30th - April 5th)</a:t>
+            </a:r>
+            <a:endParaRPr/>
+          </a:p>
+          <a:p>
+            <a:pPr indent="-317500" lvl="0" marL="457200" rtl="0" algn="l">
+              <a:spcBef>
+                <a:spcPts val="0"/>
+              </a:spcBef>
+              <a:spcAft>
+                <a:spcPts val="0"/>
+              </a:spcAft>
+              <a:buSzPts val="1400"/>
+              <a:buAutoNum type="arabicPeriod" startAt="7"/>
+            </a:pPr>
+            <a:r>
+              <a:rPr lang="en"/>
+              <a:t>Finishing Touches &amp; Presentation (April 6th - 21st)	</a:t>
             </a:r>
             <a:endParaRPr/>
           </a:p>
@@ -9184,7 +8675,7 @@
   <p:cSld>
     <p:spTree>
       <p:nvGrpSpPr>
-        <p:cNvPr id="110" name="Shape 110"/>
+        <p:cNvPr id="111" name="Shape 111"/>
         <p:cNvGrpSpPr/>
         <p:nvPr/>
       </p:nvGrpSpPr>
@@ -9198,7 +8689,7 @@
       </p:grpSpPr>
       <p:sp>
         <p:nvSpPr>
-          <p:cNvPr id="111" name="Google Shape;111;p21"/>
+          <p:cNvPr id="112" name="Google Shape;112;p21"/>
           <p:cNvSpPr txBox="1"/>
           <p:nvPr>
             <p:ph type="title"/>
@@ -9230,40 +8721,112 @@
             </a:pPr>
             <a:r>
               <a:rPr lang="en"/>
-              <a:t>Conceptual UI Design (App)</a:t>
+              <a:t>Sprint 2 Preview: Creating a Login System</a:t>
             </a:r>
             <a:endParaRPr/>
           </a:p>
         </p:txBody>
       </p:sp>
-      <p:pic>
-        <p:nvPicPr>
-          <p:cNvPr id="112" name="Google Shape;112;p21"/>
-          <p:cNvPicPr preferRelativeResize="0"/>
-          <p:nvPr/>
-        </p:nvPicPr>
-        <p:blipFill>
-          <a:blip r:embed="rId3">
-            <a:alphaModFix/>
-          </a:blip>
-          <a:stretch>
-            <a:fillRect/>
-          </a:stretch>
-        </p:blipFill>
+      <p:sp>
+        <p:nvSpPr>
+          <p:cNvPr id="113" name="Google Shape;113;p21"/>
+          <p:cNvSpPr txBox="1"/>
+          <p:nvPr>
+            <p:ph idx="1" type="body"/>
+          </p:nvPr>
+        </p:nvSpPr>
         <p:spPr>
           <a:xfrm>
-            <a:off x="864138" y="1762522"/>
-            <a:ext cx="7415726" cy="2533503"/>
+            <a:off x="387900" y="1489824"/>
+            <a:ext cx="8368200" cy="3078900"/>
           </a:xfrm>
           <a:prstGeom prst="rect">
             <a:avLst/>
           </a:prstGeom>
-          <a:noFill/>
-          <a:ln>
-            <a:noFill/>
-          </a:ln>
         </p:spPr>
-      </p:pic>
+        <p:txBody>
+          <a:bodyPr anchorCtr="0" anchor="t" bIns="91425" lIns="91425" spcFirstLastPara="1" rIns="91425" wrap="square" tIns="91425">
+            <a:noAutofit/>
+          </a:bodyPr>
+          <a:lstStyle/>
+          <a:p>
+            <a:pPr indent="0" lvl="0" marL="0" rtl="0" algn="l">
+              <a:spcBef>
+                <a:spcPts val="0"/>
+              </a:spcBef>
+              <a:spcAft>
+                <a:spcPts val="0"/>
+              </a:spcAft>
+              <a:buNone/>
+            </a:pPr>
+            <a:r>
+              <a:rPr lang="en"/>
+              <a:t>Our approach for this sprint is to form groups of 2 and work together on the necessary tasks. We split the responsibilities as follows:</a:t>
+            </a:r>
+            <a:endParaRPr/>
+          </a:p>
+          <a:p>
+            <a:pPr indent="-342900" lvl="0" marL="457200" rtl="0" algn="l">
+              <a:lnSpc>
+                <a:spcPct val="150000"/>
+              </a:lnSpc>
+              <a:spcBef>
+                <a:spcPts val="1600"/>
+              </a:spcBef>
+              <a:spcAft>
+                <a:spcPts val="0"/>
+              </a:spcAft>
+              <a:buSzPts val="1800"/>
+              <a:buChar char="●"/>
+            </a:pPr>
+            <a:r>
+              <a:rPr lang="en"/>
+              <a:t>Database Setup- Steven and Samuel</a:t>
+            </a:r>
+            <a:endParaRPr/>
+          </a:p>
+          <a:p>
+            <a:pPr indent="-342900" lvl="0" marL="457200" rtl="0" algn="l">
+              <a:lnSpc>
+                <a:spcPct val="150000"/>
+              </a:lnSpc>
+              <a:spcBef>
+                <a:spcPts val="0"/>
+              </a:spcBef>
+              <a:spcAft>
+                <a:spcPts val="0"/>
+              </a:spcAft>
+              <a:buSzPts val="1800"/>
+              <a:buChar char="●"/>
+            </a:pPr>
+            <a:r>
+              <a:rPr lang="en"/>
+              <a:t>Front-End design- Alex and Andy</a:t>
+            </a:r>
+            <a:endParaRPr/>
+          </a:p>
+          <a:p>
+            <a:pPr indent="-342900" lvl="0" marL="457200" rtl="0" algn="l">
+              <a:lnSpc>
+                <a:spcPct val="150000"/>
+              </a:lnSpc>
+              <a:spcBef>
+                <a:spcPts val="0"/>
+              </a:spcBef>
+              <a:spcAft>
+                <a:spcPts val="0"/>
+              </a:spcAft>
+              <a:buSzPts val="1800"/>
+              <a:buChar char="●"/>
+            </a:pPr>
+            <a:r>
+              <a:rPr lang="en"/>
+              <a:t>Backend design- Jacob and Nick</a:t>
+            </a:r>
+            <a:endParaRPr/>
+          </a:p>
+        </p:txBody>
+      </p:sp>
     </p:spTree>
   </p:cSld>
   <p:clrMapOvr>

</xml_diff>